<commit_message>
[UPD] Hip12 + Facebook sort
</commit_message>
<xml_diff>
--- a/tweet_data/media/HIP/HIP12.pptx
+++ b/tweet_data/media/HIP/HIP12.pptx
@@ -214,7 +214,7 @@
           <a:p>
             <a:fld id="{762B48F5-BACC-47D6-A0F7-82FBF9C6BC85}" type="datetimeFigureOut">
               <a:rPr lang="en-US"/>
-              <a:t>7/19/2021</a:t>
+              <a:t>9/22/2021</a:t>
             </a:fld>
             <a:endParaRPr/>
           </a:p>
@@ -379,7 +379,7 @@
           <a:p>
             <a:fld id="{0CB1CD00-5424-4675-AB18-2C419B060449}" type="datetimeFigureOut">
               <a:rPr lang="en-US"/>
-              <a:t>7/19/2021</a:t>
+              <a:t>9/22/2021</a:t>
             </a:fld>
             <a:endParaRPr/>
           </a:p>
@@ -1016,7 +1016,7 @@
           <a:p>
             <a:fld id="{37CC0096-1860-4642-9CD2-0079EA5E7CD1}" type="datetimeFigureOut">
               <a:rPr lang="en-US" smtClean="0"/>
-              <a:t>7/19/2021</a:t>
+              <a:t>9/22/2021</a:t>
             </a:fld>
             <a:endParaRPr lang="en-US"/>
           </a:p>
@@ -1196,7 +1196,7 @@
           <a:p>
             <a:fld id="{37CC0096-1860-4642-9CD2-0079EA5E7CD1}" type="datetimeFigureOut">
               <a:rPr lang="en-US" smtClean="0"/>
-              <a:t>7/19/2021</a:t>
+              <a:t>9/22/2021</a:t>
             </a:fld>
             <a:endParaRPr lang="en-US"/>
           </a:p>
@@ -1370,7 +1370,7 @@
           <a:p>
             <a:fld id="{37CC0096-1860-4642-9CD2-0079EA5E7CD1}" type="datetimeFigureOut">
               <a:rPr lang="en-US" smtClean="0"/>
-              <a:t>7/19/2021</a:t>
+              <a:t>9/22/2021</a:t>
             </a:fld>
             <a:endParaRPr lang="en-US"/>
           </a:p>
@@ -1805,7 +1805,7 @@
           <a:p>
             <a:fld id="{37CC0096-1860-4642-9CD2-0079EA5E7CD1}" type="datetimeFigureOut">
               <a:rPr lang="en-US" smtClean="0"/>
-              <a:t>7/19/2021</a:t>
+              <a:t>9/22/2021</a:t>
             </a:fld>
             <a:endParaRPr lang="en-US"/>
           </a:p>
@@ -2245,7 +2245,7 @@
           <a:p>
             <a:fld id="{37CC0096-1860-4642-9CD2-0079EA5E7CD1}" type="datetimeFigureOut">
               <a:rPr lang="en-US" smtClean="0"/>
-              <a:t>7/19/2021</a:t>
+              <a:t>9/22/2021</a:t>
             </a:fld>
             <a:endParaRPr lang="en-US"/>
           </a:p>
@@ -2363,7 +2363,7 @@
           <a:p>
             <a:fld id="{37CC0096-1860-4642-9CD2-0079EA5E7CD1}" type="datetimeFigureOut">
               <a:rPr lang="en-US" smtClean="0"/>
-              <a:t>7/19/2021</a:t>
+              <a:t>9/22/2021</a:t>
             </a:fld>
             <a:endParaRPr lang="en-US"/>
           </a:p>
@@ -2458,7 +2458,7 @@
           <a:p>
             <a:fld id="{37CC0096-1860-4642-9CD2-0079EA5E7CD1}" type="datetimeFigureOut">
               <a:rPr lang="en-US" smtClean="0"/>
-              <a:t>7/19/2021</a:t>
+              <a:t>9/22/2021</a:t>
             </a:fld>
             <a:endParaRPr lang="en-US"/>
           </a:p>
@@ -2742,7 +2742,7 @@
           <a:p>
             <a:fld id="{37CC0096-1860-4642-9CD2-0079EA5E7CD1}" type="datetimeFigureOut">
               <a:rPr lang="en-US" smtClean="0"/>
-              <a:t>7/19/2021</a:t>
+              <a:t>9/22/2021</a:t>
             </a:fld>
             <a:endParaRPr lang="en-US"/>
           </a:p>
@@ -3055,7 +3055,7 @@
           <a:p>
             <a:fld id="{37CC0096-1860-4642-9CD2-0079EA5E7CD1}" type="datetimeFigureOut">
               <a:rPr lang="en-US" smtClean="0"/>
-              <a:t>7/19/2021</a:t>
+              <a:t>9/22/2021</a:t>
             </a:fld>
             <a:endParaRPr lang="en-US"/>
           </a:p>
@@ -3317,7 +3317,7 @@
             <a:fld id="{37CC0096-1860-4642-9CD2-0079EA5E7CD1}" type="datetimeFigureOut">
               <a:rPr lang="en-US" smtClean="0"/>
               <a:pPr/>
-              <a:t>7/19/2021</a:t>
+              <a:t>9/22/2021</a:t>
             </a:fld>
             <a:endParaRPr lang="en-US"/>
           </a:p>
@@ -4005,8 +4005,8 @@
         </p:nvSpPr>
         <p:spPr>
           <a:xfrm>
-            <a:off x="28575" y="-228600"/>
-            <a:ext cx="12163425" cy="2092881"/>
+            <a:off x="-30480" y="91404"/>
+            <a:ext cx="12163425" cy="1569660"/>
           </a:xfrm>
           <a:prstGeom prst="rect">
             <a:avLst/>
@@ -4021,7 +4021,7 @@
           <a:p>
             <a:pPr algn="ctr"/>
             <a:r>
-              <a:rPr lang="en-US" sz="13000" b="1" dirty="0" smtClean="0">
+              <a:rPr lang="en-US" sz="9600" b="1" dirty="0" smtClean="0">
                 <a:ln w="12700">
                   <a:noFill/>
                   <a:prstDash val="solid"/>
@@ -4043,9 +4043,9 @@
                   </a:innerShdw>
                 </a:effectLst>
               </a:rPr>
-              <a:t>HIP-12</a:t>
-            </a:r>
-            <a:endParaRPr lang="en-US" sz="13000" b="1" dirty="0">
+              <a:t>VOTE: HIP-12</a:t>
+            </a:r>
+            <a:endParaRPr lang="en-US" sz="9600" b="1" dirty="0">
               <a:ln w="12700">
                 <a:noFill/>
                 <a:prstDash val="solid"/>
@@ -4094,7 +4094,7 @@
           <a:p>
             <a:pPr algn="ctr"/>
             <a:r>
-              <a:rPr lang="en-US" sz="5400" b="1" dirty="0">
+              <a:rPr lang="en-US" sz="5400" b="1" dirty="0" smtClean="0">
                 <a:ln w="12700">
                   <a:noFill/>
                   <a:prstDash val="solid"/>
@@ -4116,8 +4116,30 @@
                   </a:innerShdw>
                 </a:effectLst>
               </a:rPr>
-              <a:t>talk.harmony.one</a:t>
-            </a:r>
+              <a:t>gov.harmony.one</a:t>
+            </a:r>
+            <a:endParaRPr lang="en-US" sz="5400" b="1" dirty="0">
+              <a:ln w="12700">
+                <a:noFill/>
+                <a:prstDash val="solid"/>
+              </a:ln>
+              <a:solidFill>
+                <a:schemeClr val="bg1"/>
+              </a:solidFill>
+              <a:effectLst>
+                <a:glow rad="203200">
+                  <a:schemeClr val="tx1">
+                    <a:alpha val="68000"/>
+                  </a:schemeClr>
+                </a:glow>
+                <a:innerShdw blurRad="63500" dir="4440000">
+                  <a:schemeClr val="tx2">
+                    <a:lumMod val="50000"/>
+                    <a:alpha val="50000"/>
+                  </a:schemeClr>
+                </a:innerShdw>
+              </a:effectLst>
+            </a:endParaRPr>
           </a:p>
         </p:txBody>
       </p:sp>

</xml_diff>